<commit_message>
Small content additions and menu fixes
Updates to menus to list all subprojects
Identifies them better.
Includes the g8 template project.

Added ISO 23415 link to main page.

Add missing slides on well-formed v valid best practice

DAFFODIL-3052
</commit_message>
<xml_diff>
--- a/site/best-practices/P-Avoid-Check-Constraints.pptx
+++ b/site/best-practices/P-Avoid-Check-Constraints.pptx
@@ -5,28 +5,30 @@
     <p:sldMasterId id="2147483660" r:id="rId4"/>
   </p:sldMasterIdLst>
   <p:notesMasterIdLst>
-    <p:notesMasterId r:id="rId11"/>
+    <p:notesMasterId r:id="rId13"/>
   </p:notesMasterIdLst>
   <p:handoutMasterIdLst>
-    <p:handoutMasterId r:id="rId12"/>
+    <p:handoutMasterId r:id="rId14"/>
   </p:handoutMasterIdLst>
   <p:sldIdLst>
-    <p:sldId id="836" r:id="rId5"/>
-    <p:sldId id="829" r:id="rId6"/>
-    <p:sldId id="839" r:id="rId7"/>
-    <p:sldId id="799" r:id="rId8"/>
-    <p:sldId id="837" r:id="rId9"/>
-    <p:sldId id="838" r:id="rId10"/>
+    <p:sldId id="831" r:id="rId5"/>
+    <p:sldId id="658" r:id="rId6"/>
+    <p:sldId id="836" r:id="rId7"/>
+    <p:sldId id="829" r:id="rId8"/>
+    <p:sldId id="839" r:id="rId9"/>
+    <p:sldId id="799" r:id="rId10"/>
+    <p:sldId id="837" r:id="rId11"/>
+    <p:sldId id="838" r:id="rId12"/>
   </p:sldIdLst>
   <p:sldSz cx="12192000" cy="6858000"/>
   <p:notesSz cx="6858000" cy="9144000"/>
   <p:embeddedFontLst>
     <p:embeddedFont>
       <p:font typeface="Noto Sans" panose="020B0502040504020204" pitchFamily="34" charset="0"/>
-      <p:regular r:id="rId13"/>
-      <p:bold r:id="rId14"/>
-      <p:italic r:id="rId15"/>
-      <p:boldItalic r:id="rId16"/>
+      <p:regular r:id="rId15"/>
+      <p:bold r:id="rId16"/>
+      <p:italic r:id="rId17"/>
+      <p:boldItalic r:id="rId18"/>
     </p:embeddedFont>
   </p:embeddedFontLst>
   <p:defaultTextStyle>
@@ -145,7 +147,7 @@
 <file path=ppt/revisionInfo.xml><?xml version="1.0" encoding="utf-8"?>
 <p1510:revInfo xmlns:a="http://schemas.openxmlformats.org/drawingml/2006/main" xmlns:r="http://schemas.openxmlformats.org/officeDocument/2006/relationships" xmlns:p1510="http://schemas.microsoft.com/office/powerpoint/2015/10/main">
   <p1510:revLst>
-    <p1510:client id="{79C2F4EE-7FCF-4CA9-8540-87655A8863A7}" v="1" dt="2025-12-22T21:24:56.682"/>
+    <p1510:client id="{44590A1F-9709-42E1-A748-409EDBBB1306}" v="1" dt="2025-12-24T19:25:19.425"/>
   </p1510:revLst>
 </p1510:revInfo>
 </file>
@@ -155,10 +157,33 @@
   <pc:docChgLst>
     <pc:chgData name="Beckerle, Mike" userId="41155a9a-513c-4288-9ceb-5c90f574ab21" providerId="ADAL" clId="{93EA92E5-423E-4026-A29C-DC3240D7B59D}"/>
     <pc:docChg chg="custSel addSld modSld">
-      <pc:chgData name="Beckerle, Mike" userId="41155a9a-513c-4288-9ceb-5c90f574ab21" providerId="ADAL" clId="{93EA92E5-423E-4026-A29C-DC3240D7B59D}" dt="2025-12-22T21:27:29.186" v="1188" actId="20577"/>
+      <pc:chgData name="Beckerle, Mike" userId="41155a9a-513c-4288-9ceb-5c90f574ab21" providerId="ADAL" clId="{93EA92E5-423E-4026-A29C-DC3240D7B59D}" dt="2025-12-24T19:32:07.497" v="1602" actId="114"/>
       <pc:docMkLst>
         <pc:docMk/>
       </pc:docMkLst>
+      <pc:sldChg chg="modSp add mod">
+        <pc:chgData name="Beckerle, Mike" userId="41155a9a-513c-4288-9ceb-5c90f574ab21" providerId="ADAL" clId="{93EA92E5-423E-4026-A29C-DC3240D7B59D}" dt="2025-12-24T19:29:52.631" v="1420" actId="20577"/>
+        <pc:sldMkLst>
+          <pc:docMk/>
+          <pc:sldMk cId="1041829088" sldId="658"/>
+        </pc:sldMkLst>
+        <pc:spChg chg="mod">
+          <ac:chgData name="Beckerle, Mike" userId="41155a9a-513c-4288-9ceb-5c90f574ab21" providerId="ADAL" clId="{93EA92E5-423E-4026-A29C-DC3240D7B59D}" dt="2025-12-24T19:27:19.725" v="1288" actId="20577"/>
+          <ac:spMkLst>
+            <pc:docMk/>
+            <pc:sldMk cId="1041829088" sldId="658"/>
+            <ac:spMk id="5" creationId="{87E454BF-E5AB-59F2-DCBC-3D2505555589}"/>
+          </ac:spMkLst>
+        </pc:spChg>
+        <pc:spChg chg="mod">
+          <ac:chgData name="Beckerle, Mike" userId="41155a9a-513c-4288-9ceb-5c90f574ab21" providerId="ADAL" clId="{93EA92E5-423E-4026-A29C-DC3240D7B59D}" dt="2025-12-24T19:29:52.631" v="1420" actId="20577"/>
+          <ac:spMkLst>
+            <pc:docMk/>
+            <pc:sldMk cId="1041829088" sldId="658"/>
+            <ac:spMk id="6" creationId="{F9615C40-6685-3E99-EE14-C899AD81A0E6}"/>
+          </ac:spMkLst>
+        </pc:spChg>
+      </pc:sldChg>
       <pc:sldChg chg="modSp mod">
         <pc:chgData name="Beckerle, Mike" userId="41155a9a-513c-4288-9ceb-5c90f574ab21" providerId="ADAL" clId="{93EA92E5-423E-4026-A29C-DC3240D7B59D}" dt="2025-12-22T21:27:29.186" v="1188" actId="20577"/>
         <pc:sldMkLst>
@@ -181,14 +206,45 @@
           <pc:sldMk cId="1947122302" sldId="829"/>
         </pc:sldMkLst>
       </pc:sldChg>
+      <pc:sldChg chg="modSp add mod">
+        <pc:chgData name="Beckerle, Mike" userId="41155a9a-513c-4288-9ceb-5c90f574ab21" providerId="ADAL" clId="{93EA92E5-423E-4026-A29C-DC3240D7B59D}" dt="2025-12-24T19:26:53.937" v="1262" actId="14100"/>
+        <pc:sldMkLst>
+          <pc:docMk/>
+          <pc:sldMk cId="1842729767" sldId="831"/>
+        </pc:sldMkLst>
+        <pc:spChg chg="mod">
+          <ac:chgData name="Beckerle, Mike" userId="41155a9a-513c-4288-9ceb-5c90f574ab21" providerId="ADAL" clId="{93EA92E5-423E-4026-A29C-DC3240D7B59D}" dt="2025-12-24T19:25:52.437" v="1211" actId="20577"/>
+          <ac:spMkLst>
+            <pc:docMk/>
+            <pc:sldMk cId="1842729767" sldId="831"/>
+            <ac:spMk id="5" creationId="{7844F438-1CB2-94D3-2A3B-FC46B820F68B}"/>
+          </ac:spMkLst>
+        </pc:spChg>
+        <pc:spChg chg="mod">
+          <ac:chgData name="Beckerle, Mike" userId="41155a9a-513c-4288-9ceb-5c90f574ab21" providerId="ADAL" clId="{93EA92E5-423E-4026-A29C-DC3240D7B59D}" dt="2025-12-24T19:26:53.937" v="1262" actId="14100"/>
+          <ac:spMkLst>
+            <pc:docMk/>
+            <pc:sldMk cId="1842729767" sldId="831"/>
+            <ac:spMk id="11" creationId="{7BA8BB64-DCC3-0996-DD58-499CFD505D2E}"/>
+          </ac:spMkLst>
+        </pc:spChg>
+        <pc:spChg chg="mod">
+          <ac:chgData name="Beckerle, Mike" userId="41155a9a-513c-4288-9ceb-5c90f574ab21" providerId="ADAL" clId="{93EA92E5-423E-4026-A29C-DC3240D7B59D}" dt="2025-12-24T19:26:16.732" v="1220" actId="1076"/>
+          <ac:spMkLst>
+            <pc:docMk/>
+            <pc:sldMk cId="1842729767" sldId="831"/>
+            <ac:spMk id="12" creationId="{82C26EFF-289A-AADB-954F-75629D8B62AA}"/>
+          </ac:spMkLst>
+        </pc:spChg>
+      </pc:sldChg>
       <pc:sldChg chg="modSp mod modShow">
-        <pc:chgData name="Beckerle, Mike" userId="41155a9a-513c-4288-9ceb-5c90f574ab21" providerId="ADAL" clId="{93EA92E5-423E-4026-A29C-DC3240D7B59D}" dt="2025-12-22T21:24:36.019" v="886" actId="27636"/>
+        <pc:chgData name="Beckerle, Mike" userId="41155a9a-513c-4288-9ceb-5c90f574ab21" providerId="ADAL" clId="{93EA92E5-423E-4026-A29C-DC3240D7B59D}" dt="2025-12-24T19:31:38.920" v="1601" actId="20577"/>
         <pc:sldMkLst>
           <pc:docMk/>
           <pc:sldMk cId="3059590" sldId="836"/>
         </pc:sldMkLst>
         <pc:spChg chg="mod">
-          <ac:chgData name="Beckerle, Mike" userId="41155a9a-513c-4288-9ceb-5c90f574ab21" providerId="ADAL" clId="{93EA92E5-423E-4026-A29C-DC3240D7B59D}" dt="2025-12-22T21:24:36.019" v="886" actId="27636"/>
+          <ac:chgData name="Beckerle, Mike" userId="41155a9a-513c-4288-9ceb-5c90f574ab21" providerId="ADAL" clId="{93EA92E5-423E-4026-A29C-DC3240D7B59D}" dt="2025-12-24T19:31:38.920" v="1601" actId="20577"/>
           <ac:spMkLst>
             <pc:docMk/>
             <pc:sldMk cId="3059590" sldId="836"/>
@@ -211,19 +267,11 @@
         </pc:sldMkLst>
       </pc:sldChg>
       <pc:sldChg chg="addSp delSp modSp new mod modClrScheme chgLayout">
-        <pc:chgData name="Beckerle, Mike" userId="41155a9a-513c-4288-9ceb-5c90f574ab21" providerId="ADAL" clId="{93EA92E5-423E-4026-A29C-DC3240D7B59D}" dt="2025-12-22T21:25:36.366" v="950" actId="27636"/>
+        <pc:chgData name="Beckerle, Mike" userId="41155a9a-513c-4288-9ceb-5c90f574ab21" providerId="ADAL" clId="{93EA92E5-423E-4026-A29C-DC3240D7B59D}" dt="2025-12-24T19:32:07.497" v="1602" actId="114"/>
         <pc:sldMkLst>
           <pc:docMk/>
           <pc:sldMk cId="1543602815" sldId="839"/>
         </pc:sldMkLst>
-        <pc:spChg chg="del mod ord">
-          <ac:chgData name="Beckerle, Mike" userId="41155a9a-513c-4288-9ceb-5c90f574ab21" providerId="ADAL" clId="{93EA92E5-423E-4026-A29C-DC3240D7B59D}" dt="2025-12-22T21:24:54.249" v="888" actId="700"/>
-          <ac:spMkLst>
-            <pc:docMk/>
-            <pc:sldMk cId="1543602815" sldId="839"/>
-            <ac:spMk id="2" creationId="{98D653B6-D825-5EC4-5785-680C445CBE5C}"/>
-          </ac:spMkLst>
-        </pc:spChg>
         <pc:spChg chg="mod ord">
           <ac:chgData name="Beckerle, Mike" userId="41155a9a-513c-4288-9ceb-5c90f574ab21" providerId="ADAL" clId="{93EA92E5-423E-4026-A29C-DC3240D7B59D}" dt="2025-12-22T21:24:54.249" v="888" actId="700"/>
           <ac:spMkLst>
@@ -241,7 +289,7 @@
           </ac:spMkLst>
         </pc:spChg>
         <pc:spChg chg="add mod ord">
-          <ac:chgData name="Beckerle, Mike" userId="41155a9a-513c-4288-9ceb-5c90f574ab21" providerId="ADAL" clId="{93EA92E5-423E-4026-A29C-DC3240D7B59D}" dt="2025-12-22T21:25:36.366" v="950" actId="27636"/>
+          <ac:chgData name="Beckerle, Mike" userId="41155a9a-513c-4288-9ceb-5c90f574ab21" providerId="ADAL" clId="{93EA92E5-423E-4026-A29C-DC3240D7B59D}" dt="2025-12-24T19:32:07.497" v="1602" actId="114"/>
           <ac:spMkLst>
             <pc:docMk/>
             <pc:sldMk cId="1543602815" sldId="839"/>
@@ -352,7 +400,7 @@
               <a:rPr lang="en-US" smtClean="0">
                 <a:latin typeface="Noto Sans" panose="020B0502040504020204" pitchFamily="34" charset="0"/>
               </a:rPr>
-              <a:t>12/22/2025</a:t>
+              <a:t>12/24/2025</a:t>
             </a:fld>
             <a:endParaRPr lang="en-US" dirty="0">
               <a:latin typeface="Noto Sans" panose="020B0502040504020204" pitchFamily="34" charset="0"/>
@@ -542,7 +590,7 @@
             <a:fld id="{104331F3-F512-0241-93B1-4EC568B308ED}" type="datetimeFigureOut">
               <a:rPr lang="en-US" smtClean="0"/>
               <a:pPr/>
-              <a:t>12/22/2025</a:t>
+              <a:t>12/24/2025</a:t>
             </a:fld>
             <a:endParaRPr lang="en-US" dirty="0"/>
           </a:p>
@@ -1042,6 +1090,130 @@
 </p:sldLayout>
 </file>
 
+<file path=ppt/slideLayouts/slideLayout3.xml><?xml version="1.0" encoding="utf-8"?>
+<p:sldLayout xmlns:a="http://schemas.openxmlformats.org/drawingml/2006/main" xmlns:r="http://schemas.openxmlformats.org/officeDocument/2006/relationships" xmlns:p="http://schemas.openxmlformats.org/presentationml/2006/main" type="titleOnly">
+  <p:cSld name="Title Only">
+    <p:spTree>
+      <p:nvGrpSpPr>
+        <p:cNvPr id="1" name=""/>
+        <p:cNvGrpSpPr/>
+        <p:nvPr/>
+      </p:nvGrpSpPr>
+      <p:grpSpPr>
+        <a:xfrm>
+          <a:off x="0" y="0"/>
+          <a:ext cx="0" cy="0"/>
+          <a:chOff x="0" y="0"/>
+          <a:chExt cx="0" cy="0"/>
+        </a:xfrm>
+      </p:grpSpPr>
+      <p:sp>
+        <p:nvSpPr>
+          <p:cNvPr id="2" name="Title 1"/>
+          <p:cNvSpPr>
+            <a:spLocks noGrp="1"/>
+          </p:cNvSpPr>
+          <p:nvPr>
+            <p:ph type="title"/>
+          </p:nvPr>
+        </p:nvSpPr>
+        <p:spPr/>
+        <p:txBody>
+          <a:bodyPr/>
+          <a:lstStyle>
+            <a:lvl1pPr>
+              <a:defRPr sz="3600">
+                <a:effectLst/>
+              </a:defRPr>
+            </a:lvl1pPr>
+          </a:lstStyle>
+          <a:p>
+            <a:r>
+              <a:rPr lang="en-US" dirty="0"/>
+              <a:t>Click to edit Master title style</a:t>
+            </a:r>
+          </a:p>
+        </p:txBody>
+      </p:sp>
+      <p:sp>
+        <p:nvSpPr>
+          <p:cNvPr id="5" name="Slide Number Placeholder 4"/>
+          <p:cNvSpPr>
+            <a:spLocks noGrp="1"/>
+          </p:cNvSpPr>
+          <p:nvPr>
+            <p:ph type="sldNum" sz="quarter" idx="12"/>
+          </p:nvPr>
+        </p:nvSpPr>
+        <p:spPr/>
+        <p:txBody>
+          <a:bodyPr/>
+          <a:lstStyle/>
+          <a:p>
+            <a:fld id="{222C6BF1-6423-496B-B3DA-CA30B590FFC3}" type="slidenum">
+              <a:rPr lang="en-US" smtClean="0"/>
+              <a:t>‹#›</a:t>
+            </a:fld>
+            <a:endParaRPr lang="en-US" dirty="0"/>
+          </a:p>
+        </p:txBody>
+      </p:sp>
+      <p:sp>
+        <p:nvSpPr>
+          <p:cNvPr id="7" name="Footer Placeholder 3">
+            <a:extLst>
+              <a:ext uri="{FF2B5EF4-FFF2-40B4-BE49-F238E27FC236}">
+                <a16:creationId xmlns:a16="http://schemas.microsoft.com/office/drawing/2014/main" id="{24DFD781-4AB8-73B9-F713-FE43379C30C1}"/>
+              </a:ext>
+            </a:extLst>
+          </p:cNvPr>
+          <p:cNvSpPr>
+            <a:spLocks noGrp="1"/>
+          </p:cNvSpPr>
+          <p:nvPr>
+            <p:ph type="ftr" sz="quarter" idx="3"/>
+          </p:nvPr>
+        </p:nvSpPr>
+        <p:spPr>
+          <a:xfrm>
+            <a:off x="2264704" y="6363123"/>
+            <a:ext cx="5402347" cy="366183"/>
+          </a:xfrm>
+          <a:prstGeom prst="rect">
+            <a:avLst/>
+          </a:prstGeom>
+        </p:spPr>
+        <p:txBody>
+          <a:bodyPr vert="horz" lIns="91440" tIns="45720" rIns="91440" bIns="45720" rtlCol="0" anchor="ctr"/>
+          <a:lstStyle>
+            <a:lvl1pPr algn="ctr">
+              <a:defRPr sz="1600">
+                <a:solidFill>
+                  <a:schemeClr val="tx1">
+                    <a:tint val="75000"/>
+                  </a:schemeClr>
+                </a:solidFill>
+              </a:defRPr>
+            </a:lvl1pPr>
+          </a:lstStyle>
+          <a:p>
+            <a:endParaRPr lang="en-US" dirty="0"/>
+          </a:p>
+        </p:txBody>
+      </p:sp>
+    </p:spTree>
+    <p:extLst>
+      <p:ext uri="{BB962C8B-B14F-4D97-AF65-F5344CB8AC3E}">
+        <p14:creationId xmlns:p14="http://schemas.microsoft.com/office/powerpoint/2010/main" val="3779301970"/>
+      </p:ext>
+    </p:extLst>
+  </p:cSld>
+  <p:clrMapOvr>
+    <a:masterClrMapping/>
+  </p:clrMapOvr>
+</p:sldLayout>
+</file>
+
 <file path=ppt/slideMasters/slideMaster1.xml><?xml version="1.0" encoding="utf-8"?>
 <p:sldMaster xmlns:a="http://schemas.openxmlformats.org/drawingml/2006/main" xmlns:r="http://schemas.openxmlformats.org/officeDocument/2006/relationships" xmlns:p="http://schemas.openxmlformats.org/presentationml/2006/main">
   <p:cSld>
@@ -1235,7 +1407,7 @@
           <p:nvPr userDrawn="1"/>
         </p:nvPicPr>
         <p:blipFill>
-          <a:blip r:embed="rId4"/>
+          <a:blip r:embed="rId5"/>
           <a:stretch>
             <a:fillRect/>
           </a:stretch>
@@ -1265,7 +1437,7 @@
           <p:nvPr userDrawn="1"/>
         </p:nvPicPr>
         <p:blipFill>
-          <a:blip r:embed="rId5"/>
+          <a:blip r:embed="rId6"/>
           <a:stretch>
             <a:fillRect/>
           </a:stretch>
@@ -1331,7 +1503,7 @@
                 <a:latin typeface="Noto Sans" panose="020B0502040504020204" pitchFamily="34" charset="0"/>
                 <a:ea typeface="Noto Sans" panose="020B0502040504020204" pitchFamily="34" charset="0"/>
                 <a:cs typeface="Noto Sans" panose="020B0502040504020204" pitchFamily="34" charset="0"/>
-                <a:hlinkClick r:id="rId6"/>
+                <a:hlinkClick r:id="rId7"/>
               </a:rPr>
               <a:t>Apache License, Version 2.0</a:t>
             </a:r>
@@ -1354,6 +1526,7 @@
   <p:sldLayoutIdLst>
     <p:sldLayoutId id="2147483667" r:id="rId1"/>
     <p:sldLayoutId id="2147483671" r:id="rId2"/>
+    <p:sldLayoutId id="2147483672" r:id="rId3"/>
   </p:sldLayoutIdLst>
   <p:hf hdr="0" ftr="0" dt="0"/>
   <p:txStyles>
@@ -1644,6 +1817,867 @@
   <p:cSld>
     <p:spTree>
       <p:nvGrpSpPr>
+        <p:cNvPr id="1" name=""/>
+        <p:cNvGrpSpPr/>
+        <p:nvPr/>
+      </p:nvGrpSpPr>
+      <p:grpSpPr>
+        <a:xfrm>
+          <a:off x="0" y="0"/>
+          <a:ext cx="0" cy="0"/>
+          <a:chOff x="0" y="0"/>
+          <a:chExt cx="0" cy="0"/>
+        </a:xfrm>
+      </p:grpSpPr>
+      <p:sp>
+        <p:nvSpPr>
+          <p:cNvPr id="5" name="Title 4">
+            <a:extLst>
+              <a:ext uri="{FF2B5EF4-FFF2-40B4-BE49-F238E27FC236}">
+                <a16:creationId xmlns:a16="http://schemas.microsoft.com/office/drawing/2014/main" id="{7844F438-1CB2-94D3-2A3B-FC46B820F68B}"/>
+              </a:ext>
+            </a:extLst>
+          </p:cNvPr>
+          <p:cNvSpPr>
+            <a:spLocks noGrp="1"/>
+          </p:cNvSpPr>
+          <p:nvPr>
+            <p:ph type="title"/>
+          </p:nvPr>
+        </p:nvSpPr>
+        <p:spPr/>
+        <p:txBody>
+          <a:bodyPr/>
+          <a:lstStyle/>
+          <a:p>
+            <a:r>
+              <a:rPr lang="en-US" dirty="0"/>
+              <a:t>Well-Formed vs Valid</a:t>
+            </a:r>
+          </a:p>
+        </p:txBody>
+      </p:sp>
+      <p:sp>
+        <p:nvSpPr>
+          <p:cNvPr id="4" name="Slide Number Placeholder 3">
+            <a:extLst>
+              <a:ext uri="{FF2B5EF4-FFF2-40B4-BE49-F238E27FC236}">
+                <a16:creationId xmlns:a16="http://schemas.microsoft.com/office/drawing/2014/main" id="{69356B69-A5E2-3B89-70C2-0565E32521A4}"/>
+              </a:ext>
+            </a:extLst>
+          </p:cNvPr>
+          <p:cNvSpPr>
+            <a:spLocks noGrp="1"/>
+          </p:cNvSpPr>
+          <p:nvPr>
+            <p:ph type="sldNum" sz="quarter" idx="12"/>
+          </p:nvPr>
+        </p:nvSpPr>
+        <p:spPr/>
+        <p:txBody>
+          <a:bodyPr/>
+          <a:lstStyle/>
+          <a:p>
+            <a:fld id="{222C6BF1-6423-496B-B3DA-CA30B590FFC3}" type="slidenum">
+              <a:rPr lang="en-US" smtClean="0"/>
+              <a:t>1</a:t>
+            </a:fld>
+            <a:endParaRPr lang="en-US" dirty="0"/>
+          </a:p>
+        </p:txBody>
+      </p:sp>
+      <p:sp>
+        <p:nvSpPr>
+          <p:cNvPr id="6" name="Oval 5">
+            <a:extLst>
+              <a:ext uri="{FF2B5EF4-FFF2-40B4-BE49-F238E27FC236}">
+                <a16:creationId xmlns:a16="http://schemas.microsoft.com/office/drawing/2014/main" id="{A17361E7-F307-EAFC-091F-7AE10DFC86D5}"/>
+              </a:ext>
+            </a:extLst>
+          </p:cNvPr>
+          <p:cNvSpPr/>
+          <p:nvPr/>
+        </p:nvSpPr>
+        <p:spPr>
+          <a:xfrm>
+            <a:off x="8712200" y="1109133"/>
+            <a:ext cx="2797866" cy="5181599"/>
+          </a:xfrm>
+          <a:prstGeom prst="ellipse">
+            <a:avLst/>
+          </a:prstGeom>
+          <a:solidFill>
+            <a:srgbClr val="FFCCFF"/>
+          </a:solidFill>
+        </p:spPr>
+        <p:style>
+          <a:lnRef idx="2">
+            <a:schemeClr val="accent1">
+              <a:shade val="15000"/>
+            </a:schemeClr>
+          </a:lnRef>
+          <a:fillRef idx="1">
+            <a:schemeClr val="accent1"/>
+          </a:fillRef>
+          <a:effectRef idx="0">
+            <a:schemeClr val="accent1"/>
+          </a:effectRef>
+          <a:fontRef idx="minor">
+            <a:schemeClr val="lt1"/>
+          </a:fontRef>
+        </p:style>
+        <p:txBody>
+          <a:bodyPr rtlCol="0" anchor="ctr"/>
+          <a:lstStyle/>
+          <a:p>
+            <a:pPr algn="ctr"/>
+            <a:r>
+              <a:rPr lang="en-US" b="1" i="1" dirty="0">
+                <a:solidFill>
+                  <a:schemeClr val="tx1"/>
+                </a:solidFill>
+              </a:rPr>
+              <a:t>Malformed</a:t>
+            </a:r>
+          </a:p>
+          <a:p>
+            <a:pPr algn="ctr"/>
+            <a:endParaRPr lang="en-US" dirty="0">
+              <a:solidFill>
+                <a:schemeClr val="tx1"/>
+              </a:solidFill>
+            </a:endParaRPr>
+          </a:p>
+          <a:p>
+            <a:pPr algn="ctr"/>
+            <a:r>
+              <a:rPr lang="en-US" dirty="0">
+                <a:solidFill>
+                  <a:schemeClr val="tx1"/>
+                </a:solidFill>
+              </a:rPr>
+              <a:t>DFDL Parse Fails</a:t>
+            </a:r>
+          </a:p>
+          <a:p>
+            <a:pPr algn="ctr"/>
+            <a:endParaRPr lang="en-US" dirty="0">
+              <a:solidFill>
+                <a:schemeClr val="tx1"/>
+              </a:solidFill>
+            </a:endParaRPr>
+          </a:p>
+          <a:p>
+            <a:pPr algn="ctr"/>
+            <a:r>
+              <a:rPr lang="en-US" dirty="0">
+                <a:solidFill>
+                  <a:schemeClr val="tx1"/>
+                </a:solidFill>
+              </a:rPr>
+              <a:t>Can't create any XML</a:t>
+            </a:r>
+          </a:p>
+        </p:txBody>
+      </p:sp>
+      <p:sp>
+        <p:nvSpPr>
+          <p:cNvPr id="7" name="Oval 6">
+            <a:extLst>
+              <a:ext uri="{FF2B5EF4-FFF2-40B4-BE49-F238E27FC236}">
+                <a16:creationId xmlns:a16="http://schemas.microsoft.com/office/drawing/2014/main" id="{3A94B24D-6877-DD0D-8AE4-FD51D73C499D}"/>
+              </a:ext>
+            </a:extLst>
+          </p:cNvPr>
+          <p:cNvSpPr/>
+          <p:nvPr/>
+        </p:nvSpPr>
+        <p:spPr>
+          <a:xfrm>
+            <a:off x="118334" y="1109133"/>
+            <a:ext cx="8593866" cy="5427133"/>
+          </a:xfrm>
+          <a:prstGeom prst="ellipse">
+            <a:avLst/>
+          </a:prstGeom>
+          <a:solidFill>
+            <a:schemeClr val="accent3">
+              <a:lumMod val="95000"/>
+            </a:schemeClr>
+          </a:solidFill>
+        </p:spPr>
+        <p:style>
+          <a:lnRef idx="2">
+            <a:schemeClr val="accent1">
+              <a:shade val="15000"/>
+            </a:schemeClr>
+          </a:lnRef>
+          <a:fillRef idx="1">
+            <a:schemeClr val="accent1"/>
+          </a:fillRef>
+          <a:effectRef idx="0">
+            <a:schemeClr val="accent1"/>
+          </a:effectRef>
+          <a:fontRef idx="minor">
+            <a:schemeClr val="lt1"/>
+          </a:fontRef>
+        </p:style>
+        <p:txBody>
+          <a:bodyPr rtlCol="0" anchor="ctr"/>
+          <a:lstStyle/>
+          <a:p>
+            <a:pPr algn="ctr"/>
+            <a:endParaRPr lang="en-US">
+              <a:solidFill>
+                <a:schemeClr val="tx1"/>
+              </a:solidFill>
+            </a:endParaRPr>
+          </a:p>
+        </p:txBody>
+      </p:sp>
+      <p:sp>
+        <p:nvSpPr>
+          <p:cNvPr id="8" name="Oval 7">
+            <a:extLst>
+              <a:ext uri="{FF2B5EF4-FFF2-40B4-BE49-F238E27FC236}">
+                <a16:creationId xmlns:a16="http://schemas.microsoft.com/office/drawing/2014/main" id="{AD36B97A-040A-0090-987E-1BD53A396167}"/>
+              </a:ext>
+            </a:extLst>
+          </p:cNvPr>
+          <p:cNvSpPr/>
+          <p:nvPr/>
+        </p:nvSpPr>
+        <p:spPr>
+          <a:xfrm>
+            <a:off x="270734" y="1912358"/>
+            <a:ext cx="5478133" cy="3664721"/>
+          </a:xfrm>
+          <a:prstGeom prst="ellipse">
+            <a:avLst/>
+          </a:prstGeom>
+          <a:solidFill>
+            <a:schemeClr val="accent3">
+              <a:lumMod val="85000"/>
+            </a:schemeClr>
+          </a:solidFill>
+        </p:spPr>
+        <p:style>
+          <a:lnRef idx="2">
+            <a:schemeClr val="accent1">
+              <a:shade val="15000"/>
+            </a:schemeClr>
+          </a:lnRef>
+          <a:fillRef idx="1">
+            <a:schemeClr val="accent1"/>
+          </a:fillRef>
+          <a:effectRef idx="0">
+            <a:schemeClr val="accent1"/>
+          </a:effectRef>
+          <a:fontRef idx="minor">
+            <a:schemeClr val="lt1"/>
+          </a:fontRef>
+        </p:style>
+        <p:txBody>
+          <a:bodyPr rtlCol="0" anchor="ctr"/>
+          <a:lstStyle/>
+          <a:p>
+            <a:pPr algn="ctr"/>
+            <a:endParaRPr lang="en-US">
+              <a:solidFill>
+                <a:schemeClr val="tx1"/>
+              </a:solidFill>
+            </a:endParaRPr>
+          </a:p>
+        </p:txBody>
+      </p:sp>
+      <p:sp>
+        <p:nvSpPr>
+          <p:cNvPr id="9" name="Oval 8">
+            <a:extLst>
+              <a:ext uri="{FF2B5EF4-FFF2-40B4-BE49-F238E27FC236}">
+                <a16:creationId xmlns:a16="http://schemas.microsoft.com/office/drawing/2014/main" id="{8667CDED-FDE9-BC44-D882-B8B6257DB72A}"/>
+              </a:ext>
+            </a:extLst>
+          </p:cNvPr>
+          <p:cNvSpPr/>
+          <p:nvPr/>
+        </p:nvSpPr>
+        <p:spPr>
+          <a:xfrm>
+            <a:off x="423134" y="2429932"/>
+            <a:ext cx="2747357" cy="2629572"/>
+          </a:xfrm>
+          <a:prstGeom prst="ellipse">
+            <a:avLst/>
+          </a:prstGeom>
+          <a:solidFill>
+            <a:schemeClr val="accent1">
+              <a:lumMod val="20000"/>
+              <a:lumOff val="80000"/>
+            </a:schemeClr>
+          </a:solidFill>
+        </p:spPr>
+        <p:style>
+          <a:lnRef idx="2">
+            <a:schemeClr val="accent1">
+              <a:shade val="15000"/>
+            </a:schemeClr>
+          </a:lnRef>
+          <a:fillRef idx="1">
+            <a:schemeClr val="accent1"/>
+          </a:fillRef>
+          <a:effectRef idx="0">
+            <a:schemeClr val="accent1"/>
+          </a:effectRef>
+          <a:fontRef idx="minor">
+            <a:schemeClr val="lt1"/>
+          </a:fontRef>
+        </p:style>
+        <p:txBody>
+          <a:bodyPr rtlCol="0" anchor="ctr"/>
+          <a:lstStyle/>
+          <a:p>
+            <a:pPr algn="ctr"/>
+            <a:endParaRPr lang="en-US">
+              <a:solidFill>
+                <a:schemeClr val="tx1"/>
+              </a:solidFill>
+            </a:endParaRPr>
+          </a:p>
+        </p:txBody>
+      </p:sp>
+      <p:sp>
+        <p:nvSpPr>
+          <p:cNvPr id="10" name="TextBox 9">
+            <a:extLst>
+              <a:ext uri="{FF2B5EF4-FFF2-40B4-BE49-F238E27FC236}">
+                <a16:creationId xmlns:a16="http://schemas.microsoft.com/office/drawing/2014/main" id="{E1645EF9-CD91-6380-B634-5162C85DB0A2}"/>
+              </a:ext>
+            </a:extLst>
+          </p:cNvPr>
+          <p:cNvSpPr txBox="1"/>
+          <p:nvPr/>
+        </p:nvSpPr>
+        <p:spPr>
+          <a:xfrm>
+            <a:off x="6096000" y="2887133"/>
+            <a:ext cx="2488182" cy="1477328"/>
+          </a:xfrm>
+          <a:prstGeom prst="rect">
+            <a:avLst/>
+          </a:prstGeom>
+          <a:noFill/>
+        </p:spPr>
+        <p:txBody>
+          <a:bodyPr wrap="none" rtlCol="0">
+            <a:spAutoFit/>
+          </a:bodyPr>
+          <a:lstStyle/>
+          <a:p>
+            <a:r>
+              <a:rPr lang="en-US" b="1" i="1" dirty="0"/>
+              <a:t>Well-Formed</a:t>
+            </a:r>
+          </a:p>
+          <a:p>
+            <a:endParaRPr lang="en-US" dirty="0"/>
+          </a:p>
+          <a:p>
+            <a:r>
+              <a:rPr lang="en-US" dirty="0"/>
+              <a:t>DFDL Parse Succeeds</a:t>
+            </a:r>
+          </a:p>
+          <a:p>
+            <a:endParaRPr lang="en-US" dirty="0"/>
+          </a:p>
+          <a:p>
+            <a:r>
+              <a:rPr lang="en-US" dirty="0"/>
+              <a:t>XML is Created</a:t>
+            </a:r>
+          </a:p>
+        </p:txBody>
+      </p:sp>
+      <p:sp>
+        <p:nvSpPr>
+          <p:cNvPr id="11" name="TextBox 10">
+            <a:extLst>
+              <a:ext uri="{FF2B5EF4-FFF2-40B4-BE49-F238E27FC236}">
+                <a16:creationId xmlns:a16="http://schemas.microsoft.com/office/drawing/2014/main" id="{7BA8BB64-DCC3-0996-DD58-499CFD505D2E}"/>
+              </a:ext>
+            </a:extLst>
+          </p:cNvPr>
+          <p:cNvSpPr txBox="1"/>
+          <p:nvPr/>
+        </p:nvSpPr>
+        <p:spPr>
+          <a:xfrm>
+            <a:off x="3322891" y="2617969"/>
+            <a:ext cx="2255976" cy="2031325"/>
+          </a:xfrm>
+          <a:prstGeom prst="rect">
+            <a:avLst/>
+          </a:prstGeom>
+          <a:noFill/>
+        </p:spPr>
+        <p:txBody>
+          <a:bodyPr wrap="square" rtlCol="0">
+            <a:spAutoFit/>
+          </a:bodyPr>
+          <a:lstStyle/>
+          <a:p>
+            <a:r>
+              <a:rPr lang="en-US" b="1" i="1" dirty="0"/>
+              <a:t>Valid</a:t>
+            </a:r>
+          </a:p>
+          <a:p>
+            <a:endParaRPr lang="en-US" dirty="0"/>
+          </a:p>
+          <a:p>
+            <a:r>
+              <a:rPr lang="en-US" dirty="0"/>
+              <a:t>XML Schema Facet</a:t>
+            </a:r>
+          </a:p>
+          <a:p>
+            <a:r>
+              <a:rPr lang="en-US" dirty="0"/>
+              <a:t>Constraints Hold</a:t>
+            </a:r>
+          </a:p>
+          <a:p>
+            <a:endParaRPr lang="en-US" dirty="0"/>
+          </a:p>
+          <a:p>
+            <a:r>
+              <a:rPr lang="en-US" dirty="0" err="1"/>
+              <a:t>Schematron</a:t>
+            </a:r>
+            <a:r>
+              <a:rPr lang="en-US" dirty="0"/>
+              <a:t> Rules Pass</a:t>
+            </a:r>
+          </a:p>
+        </p:txBody>
+      </p:sp>
+      <p:sp>
+        <p:nvSpPr>
+          <p:cNvPr id="12" name="TextBox 11">
+            <a:extLst>
+              <a:ext uri="{FF2B5EF4-FFF2-40B4-BE49-F238E27FC236}">
+                <a16:creationId xmlns:a16="http://schemas.microsoft.com/office/drawing/2014/main" id="{82C26EFF-289A-AADB-954F-75629D8B62AA}"/>
+              </a:ext>
+            </a:extLst>
+          </p:cNvPr>
+          <p:cNvSpPr txBox="1"/>
+          <p:nvPr/>
+        </p:nvSpPr>
+        <p:spPr>
+          <a:xfrm>
+            <a:off x="1208455" y="3499533"/>
+            <a:ext cx="990977" cy="646331"/>
+          </a:xfrm>
+          <a:prstGeom prst="rect">
+            <a:avLst/>
+          </a:prstGeom>
+          <a:noFill/>
+        </p:spPr>
+        <p:txBody>
+          <a:bodyPr wrap="none" rtlCol="0">
+            <a:spAutoFit/>
+          </a:bodyPr>
+          <a:lstStyle/>
+          <a:p>
+            <a:r>
+              <a:rPr lang="en-US" b="1" i="1" dirty="0"/>
+              <a:t>Correct</a:t>
+            </a:r>
+          </a:p>
+          <a:p>
+            <a:endParaRPr lang="en-US" dirty="0"/>
+          </a:p>
+        </p:txBody>
+      </p:sp>
+    </p:spTree>
+    <p:extLst>
+      <p:ext uri="{BB962C8B-B14F-4D97-AF65-F5344CB8AC3E}">
+        <p14:creationId xmlns:p14="http://schemas.microsoft.com/office/powerpoint/2010/main" val="1842729767"/>
+      </p:ext>
+    </p:extLst>
+  </p:cSld>
+  <p:clrMapOvr>
+    <a:masterClrMapping/>
+  </p:clrMapOvr>
+</p:sld>
+</file>
+
+<file path=ppt/slides/slide2.xml><?xml version="1.0" encoding="utf-8"?>
+<p:sld xmlns:a="http://schemas.openxmlformats.org/drawingml/2006/main" xmlns:r="http://schemas.openxmlformats.org/officeDocument/2006/relationships" xmlns:p="http://schemas.openxmlformats.org/presentationml/2006/main">
+  <p:cSld>
+    <p:spTree>
+      <p:nvGrpSpPr>
+        <p:cNvPr id="1" name=""/>
+        <p:cNvGrpSpPr/>
+        <p:nvPr/>
+      </p:nvGrpSpPr>
+      <p:grpSpPr>
+        <a:xfrm>
+          <a:off x="0" y="0"/>
+          <a:ext cx="0" cy="0"/>
+          <a:chOff x="0" y="0"/>
+          <a:chExt cx="0" cy="0"/>
+        </a:xfrm>
+      </p:grpSpPr>
+      <p:sp>
+        <p:nvSpPr>
+          <p:cNvPr id="93" name="TextShape 1"/>
+          <p:cNvSpPr txBox="1"/>
+          <p:nvPr/>
+        </p:nvSpPr>
+        <p:spPr>
+          <a:xfrm>
+            <a:off x="1981200" y="351000"/>
+            <a:ext cx="8229240" cy="563040"/>
+          </a:xfrm>
+          <a:prstGeom prst="rect">
+            <a:avLst/>
+          </a:prstGeom>
+          <a:noFill/>
+          <a:ln>
+            <a:noFill/>
+          </a:ln>
+        </p:spPr>
+        <p:txBody>
+          <a:bodyPr anchor="ctr"/>
+          <a:lstStyle/>
+          <a:p>
+            <a:pPr>
+              <a:lnSpc>
+                <a:spcPct val="100000"/>
+              </a:lnSpc>
+            </a:pPr>
+            <a:endParaRPr lang="en-US" spc="-1" dirty="0">
+              <a:solidFill>
+                <a:srgbClr val="000000"/>
+              </a:solidFill>
+              <a:uFill>
+                <a:solidFill>
+                  <a:srgbClr val="FFFFFF"/>
+                </a:solidFill>
+              </a:uFill>
+              <a:latin typeface="Calibri Light"/>
+            </a:endParaRPr>
+          </a:p>
+        </p:txBody>
+      </p:sp>
+      <p:sp>
+        <p:nvSpPr>
+          <p:cNvPr id="94" name="TextShape 2"/>
+          <p:cNvSpPr txBox="1"/>
+          <p:nvPr/>
+        </p:nvSpPr>
+        <p:spPr>
+          <a:xfrm>
+            <a:off x="1981200" y="1066680"/>
+            <a:ext cx="8229240" cy="5232520"/>
+          </a:xfrm>
+          <a:prstGeom prst="rect">
+            <a:avLst/>
+          </a:prstGeom>
+          <a:noFill/>
+          <a:ln>
+            <a:noFill/>
+          </a:ln>
+        </p:spPr>
+        <p:txBody>
+          <a:bodyPr>
+            <a:normAutofit/>
+          </a:bodyPr>
+          <a:lstStyle/>
+          <a:p>
+            <a:endParaRPr lang="en-US" sz="2800" spc="-1" dirty="0">
+              <a:solidFill>
+                <a:srgbClr val="23408F"/>
+              </a:solidFill>
+              <a:uFill>
+                <a:solidFill>
+                  <a:srgbClr val="FFFFFF"/>
+                </a:solidFill>
+              </a:uFill>
+              <a:latin typeface="Calibri"/>
+            </a:endParaRPr>
+          </a:p>
+        </p:txBody>
+      </p:sp>
+      <p:sp>
+        <p:nvSpPr>
+          <p:cNvPr id="6" name="Content Placeholder 5">
+            <a:extLst>
+              <a:ext uri="{FF2B5EF4-FFF2-40B4-BE49-F238E27FC236}">
+                <a16:creationId xmlns:a16="http://schemas.microsoft.com/office/drawing/2014/main" id="{F9615C40-6685-3E99-EE14-C899AD81A0E6}"/>
+              </a:ext>
+            </a:extLst>
+          </p:cNvPr>
+          <p:cNvSpPr>
+            <a:spLocks noGrp="1"/>
+          </p:cNvSpPr>
+          <p:nvPr>
+            <p:ph idx="1"/>
+          </p:nvPr>
+        </p:nvSpPr>
+        <p:spPr>
+          <a:xfrm>
+            <a:off x="304800" y="1066800"/>
+            <a:ext cx="11605067" cy="5105400"/>
+          </a:xfrm>
+        </p:spPr>
+        <p:txBody>
+          <a:bodyPr vert="horz" lIns="91440" tIns="45720" rIns="91440" bIns="45720" rtlCol="0" anchor="t">
+            <a:normAutofit fontScale="55000" lnSpcReduction="20000"/>
+          </a:bodyPr>
+          <a:lstStyle/>
+          <a:p>
+            <a:r>
+              <a:rPr lang="en-US" dirty="0"/>
+              <a:t>Malformed Data</a:t>
+            </a:r>
+          </a:p>
+          <a:p>
+            <a:pPr lvl="1"/>
+            <a:r>
+              <a:rPr lang="en-US" dirty="0"/>
+              <a:t>DFDL Parse fails - we cannot even create XML from the data</a:t>
+            </a:r>
+          </a:p>
+          <a:p>
+            <a:pPr lvl="1"/>
+            <a:endParaRPr lang="en-US" dirty="0"/>
+          </a:p>
+          <a:p>
+            <a:r>
+              <a:rPr lang="en-US" dirty="0"/>
+              <a:t>Well-Formed Data</a:t>
+            </a:r>
+          </a:p>
+          <a:p>
+            <a:pPr lvl="1"/>
+            <a:r>
+              <a:rPr lang="en-US" dirty="0"/>
+              <a:t>Can find every field's location and length</a:t>
+            </a:r>
+          </a:p>
+          <a:p>
+            <a:pPr lvl="1"/>
+            <a:r>
+              <a:rPr lang="en-US" dirty="0"/>
+              <a:t>Can convert each field to its logical type</a:t>
+            </a:r>
+          </a:p>
+          <a:p>
+            <a:pPr lvl="1"/>
+            <a:r>
+              <a:rPr lang="en-US" dirty="0"/>
+              <a:t>DFDL Parse can succeed</a:t>
+            </a:r>
+          </a:p>
+          <a:p>
+            <a:pPr lvl="1"/>
+            <a:r>
+              <a:rPr lang="en-US" dirty="0"/>
+              <a:t>Can create XML from the data</a:t>
+            </a:r>
+          </a:p>
+          <a:p>
+            <a:pPr lvl="1"/>
+            <a:r>
+              <a:rPr lang="en-US" dirty="0"/>
+              <a:t>But note: This XML </a:t>
+            </a:r>
+            <a:r>
+              <a:rPr lang="en-US" i="1" dirty="0"/>
+              <a:t>may not be valid</a:t>
+            </a:r>
+          </a:p>
+          <a:p>
+            <a:endParaRPr lang="en-US" dirty="0"/>
+          </a:p>
+          <a:p>
+            <a:r>
+              <a:rPr lang="en-US" dirty="0"/>
+              <a:t>Valid Data</a:t>
+            </a:r>
+          </a:p>
+          <a:p>
+            <a:pPr lvl="1"/>
+            <a:r>
+              <a:rPr lang="en-US" dirty="0"/>
+              <a:t>Obeys schema constraints (facets, </a:t>
+            </a:r>
+            <a:r>
+              <a:rPr lang="en-US" dirty="0" err="1"/>
+              <a:t>Schematron</a:t>
+            </a:r>
+            <a:r>
+              <a:rPr lang="en-US" dirty="0"/>
+              <a:t> rules)</a:t>
+            </a:r>
+          </a:p>
+          <a:p>
+            <a:pPr lvl="2"/>
+            <a:r>
+              <a:rPr lang="en-US" dirty="0"/>
+              <a:t>Range of numbers, dates, times, patterns of text</a:t>
+            </a:r>
+          </a:p>
+          <a:p>
+            <a:pPr lvl="1"/>
+            <a:r>
+              <a:rPr lang="en-US" dirty="0"/>
+              <a:t>Validation usually done by separate filter step or steps, not the DFDL Parser</a:t>
+            </a:r>
+          </a:p>
+          <a:p>
+            <a:pPr lvl="1"/>
+            <a:endParaRPr lang="en-US" dirty="0"/>
+          </a:p>
+          <a:p>
+            <a:r>
+              <a:rPr lang="en-US" dirty="0"/>
+              <a:t>Correct Data</a:t>
+            </a:r>
+          </a:p>
+          <a:p>
+            <a:pPr lvl="1"/>
+            <a:r>
+              <a:rPr lang="en-US" dirty="0"/>
+              <a:t>All applications run without issues.</a:t>
+            </a:r>
+          </a:p>
+          <a:p>
+            <a:endParaRPr lang="en-US" dirty="0"/>
+          </a:p>
+          <a:p>
+            <a:endParaRPr lang="en-US" dirty="0"/>
+          </a:p>
+        </p:txBody>
+      </p:sp>
+      <p:sp>
+        <p:nvSpPr>
+          <p:cNvPr id="4" name="Slide Number Placeholder 3">
+            <a:extLst>
+              <a:ext uri="{FF2B5EF4-FFF2-40B4-BE49-F238E27FC236}">
+                <a16:creationId xmlns:a16="http://schemas.microsoft.com/office/drawing/2014/main" id="{EE65B1C2-1F9F-D3F1-09FB-DEB76476CAAE}"/>
+              </a:ext>
+            </a:extLst>
+          </p:cNvPr>
+          <p:cNvSpPr>
+            <a:spLocks noGrp="1"/>
+          </p:cNvSpPr>
+          <p:nvPr>
+            <p:ph type="sldNum" sz="quarter" idx="12"/>
+          </p:nvPr>
+        </p:nvSpPr>
+        <p:spPr>
+          <a:xfrm>
+            <a:off x="11514338" y="6384454"/>
+            <a:ext cx="508000" cy="365125"/>
+          </a:xfrm>
+        </p:spPr>
+        <p:txBody>
+          <a:bodyPr/>
+          <a:lstStyle/>
+          <a:p>
+            <a:fld id="{E87A9C04-9BE2-4A9F-A3FE-72B96988022F}" type="slidenum">
+              <a:rPr lang="en-US" smtClean="0"/>
+              <a:pPr/>
+              <a:t>2</a:t>
+            </a:fld>
+            <a:endParaRPr lang="en-US" dirty="0"/>
+          </a:p>
+        </p:txBody>
+      </p:sp>
+      <p:sp>
+        <p:nvSpPr>
+          <p:cNvPr id="5" name="Title 4">
+            <a:extLst>
+              <a:ext uri="{FF2B5EF4-FFF2-40B4-BE49-F238E27FC236}">
+                <a16:creationId xmlns:a16="http://schemas.microsoft.com/office/drawing/2014/main" id="{87E454BF-E5AB-59F2-DCBC-3D2505555589}"/>
+              </a:ext>
+            </a:extLst>
+          </p:cNvPr>
+          <p:cNvSpPr>
+            <a:spLocks noGrp="1"/>
+          </p:cNvSpPr>
+          <p:nvPr>
+            <p:ph type="title"/>
+          </p:nvPr>
+        </p:nvSpPr>
+        <p:spPr>
+          <a:xfrm>
+            <a:off x="177553" y="162289"/>
+            <a:ext cx="11732313" cy="563563"/>
+          </a:xfrm>
+        </p:spPr>
+        <p:txBody>
+          <a:bodyPr>
+            <a:normAutofit fontScale="90000"/>
+          </a:bodyPr>
+          <a:lstStyle/>
+          <a:p>
+            <a:r>
+              <a:rPr lang="en-US" dirty="0"/>
+              <a:t>Well-Formed vs Valid</a:t>
+            </a:r>
+          </a:p>
+        </p:txBody>
+      </p:sp>
+    </p:spTree>
+    <p:extLst>
+      <p:ext uri="{BB962C8B-B14F-4D97-AF65-F5344CB8AC3E}">
+        <p14:creationId xmlns:p14="http://schemas.microsoft.com/office/powerpoint/2010/main" val="1041829088"/>
+      </p:ext>
+    </p:extLst>
+  </p:cSld>
+  <p:clrMapOvr>
+    <a:masterClrMapping/>
+  </p:clrMapOvr>
+  <p:timing>
+    <p:tnLst>
+      <p:par>
+        <p:cTn id="1" dur="indefinite" restart="never" nodeType="tmRoot">
+          <p:childTnLst>
+            <p:seq>
+              <p:cTn id="2" nodeType="mainSeq"/>
+              <p:prevCondLst>
+                <p:cond evt="onPrev" delay="0">
+                  <p:tgtEl>
+                    <p:sldTgt/>
+                  </p:tgtEl>
+                </p:cond>
+              </p:prevCondLst>
+              <p:nextCondLst>
+                <p:cond evt="onNext" delay="0">
+                  <p:tgtEl>
+                    <p:sldTgt/>
+                  </p:tgtEl>
+                </p:cond>
+              </p:nextCondLst>
+            </p:seq>
+          </p:childTnLst>
+        </p:cTn>
+      </p:par>
+    </p:tnLst>
+  </p:timing>
+</p:sld>
+</file>
+
+<file path=ppt/slides/slide3.xml><?xml version="1.0" encoding="utf-8"?>
+<p:sld xmlns:a="http://schemas.openxmlformats.org/drawingml/2006/main" xmlns:r="http://schemas.openxmlformats.org/officeDocument/2006/relationships" xmlns:p="http://schemas.openxmlformats.org/presentationml/2006/main">
+  <p:cSld>
+    <p:spTree>
+      <p:nvGrpSpPr>
         <p:cNvPr id="1" name="">
           <a:extLst>
             <a:ext uri="{FF2B5EF4-FFF2-40B4-BE49-F238E27FC236}">
@@ -1709,7 +2743,7 @@
         <p:spPr/>
         <p:txBody>
           <a:bodyPr>
-            <a:normAutofit fontScale="85000" lnSpcReduction="20000"/>
+            <a:normAutofit fontScale="62500" lnSpcReduction="20000"/>
           </a:bodyPr>
           <a:lstStyle/>
           <a:p>
@@ -1769,11 +2803,47 @@
             </a:r>
             <a:r>
               <a:rPr lang="en-US" i="1" dirty="0"/>
+              <a:t>reject</a:t>
+            </a:r>
+            <a:r>
+              <a:rPr lang="en-US" dirty="0"/>
+              <a:t> malformed data (important)</a:t>
+            </a:r>
+          </a:p>
+          <a:p>
+            <a:pPr lvl="1"/>
+            <a:r>
+              <a:rPr lang="en-US" dirty="0"/>
+              <a:t>It's easy to write a DFDL schema that accepts well-formed and lots of malformed data also.</a:t>
+            </a:r>
+          </a:p>
+          <a:p>
+            <a:pPr lvl="1"/>
+            <a:r>
+              <a:rPr lang="en-US" dirty="0"/>
+              <a:t>Must design the schema to reject malformed as well as accept well-formed data.</a:t>
+            </a:r>
+          </a:p>
+          <a:p>
+            <a:r>
+              <a:rPr lang="en-US" dirty="0"/>
+              <a:t>Parsing should </a:t>
+            </a:r>
+            <a:r>
+              <a:rPr lang="en-US" b="1" i="1" dirty="0"/>
               <a:t>not</a:t>
             </a:r>
             <a:r>
               <a:rPr lang="en-US" dirty="0"/>
-              <a:t> reject invalid data</a:t>
+              <a:t> reject </a:t>
+            </a:r>
+            <a:r>
+              <a:rPr lang="en-US" i="1" dirty="0"/>
+              <a:t>invalid</a:t>
+            </a:r>
+            <a:r>
+              <a:rPr lang="en-US" dirty="0"/>
+              <a:t> data</a:t>
             </a:r>
           </a:p>
           <a:p>
@@ -1848,7 +2918,7 @@
             <a:fld id="{E86E9A59-3F40-F444-BD0F-26E6D063A5F0}" type="slidenum">
               <a:rPr lang="en-US" smtClean="0"/>
               <a:pPr/>
-              <a:t>1</a:t>
+              <a:t>3</a:t>
             </a:fld>
             <a:endParaRPr lang="en-US" dirty="0"/>
           </a:p>
@@ -1867,7 +2937,7 @@
 </p:sld>
 </file>
 
-<file path=ppt/slides/slide2.xml><?xml version="1.0" encoding="utf-8"?>
+<file path=ppt/slides/slide4.xml><?xml version="1.0" encoding="utf-8"?>
 <p:sld xmlns:a="http://schemas.openxmlformats.org/drawingml/2006/main" xmlns:r="http://schemas.openxmlformats.org/officeDocument/2006/relationships" xmlns:p="http://schemas.openxmlformats.org/presentationml/2006/main">
   <p:cSld>
     <p:spTree>
@@ -2067,7 +3137,7 @@
             <a:fld id="{E86E9A59-3F40-F444-BD0F-26E6D063A5F0}" type="slidenum">
               <a:rPr lang="en-US" smtClean="0"/>
               <a:pPr/>
-              <a:t>2</a:t>
+              <a:t>4</a:t>
             </a:fld>
             <a:endParaRPr lang="en-US" dirty="0"/>
           </a:p>
@@ -2086,7 +3156,7 @@
 </p:sld>
 </file>
 
-<file path=ppt/slides/slide3.xml><?xml version="1.0" encoding="utf-8"?>
+<file path=ppt/slides/slide5.xml><?xml version="1.0" encoding="utf-8"?>
 <p:sld xmlns:a="http://schemas.openxmlformats.org/drawingml/2006/main" xmlns:r="http://schemas.openxmlformats.org/officeDocument/2006/relationships" xmlns:p="http://schemas.openxmlformats.org/presentationml/2006/main">
   <p:cSld>
     <p:spTree>
@@ -2156,7 +3226,15 @@
           <a:p>
             <a:r>
               <a:rPr lang="en-US" dirty="0"/>
-              <a:t>You should not use DFDL parse errors as a 'fail fast' way to reject invalid data. </a:t>
+              <a:t>You should not use DFDL parse errors as a 'fail fast' way to reject </a:t>
+            </a:r>
+            <a:r>
+              <a:rPr lang="en-US" i="1" dirty="0"/>
+              <a:t>invalid</a:t>
+            </a:r>
+            <a:r>
+              <a:rPr lang="en-US" dirty="0"/>
+              <a:t> data. </a:t>
             </a:r>
           </a:p>
           <a:p>
@@ -2206,7 +3284,7 @@
             <a:fld id="{E87A9C04-9BE2-4A9F-A3FE-72B96988022F}" type="slidenum">
               <a:rPr lang="en-US" smtClean="0"/>
               <a:pPr/>
-              <a:t>3</a:t>
+              <a:t>5</a:t>
             </a:fld>
             <a:endParaRPr lang="en-US" dirty="0"/>
           </a:p>
@@ -2225,7 +3303,7 @@
 </p:sld>
 </file>
 
-<file path=ppt/slides/slide4.xml><?xml version="1.0" encoding="utf-8"?>
+<file path=ppt/slides/slide6.xml><?xml version="1.0" encoding="utf-8"?>
 <p:sld xmlns:a="http://schemas.openxmlformats.org/drawingml/2006/main" xmlns:r="http://schemas.openxmlformats.org/officeDocument/2006/relationships" xmlns:p="http://schemas.openxmlformats.org/presentationml/2006/main">
   <p:cSld>
     <p:spTree>
@@ -2348,7 +3426,7 @@
                 <a:tabLst/>
                 <a:defRPr/>
               </a:pPr>
-              <a:t>4</a:t>
+              <a:t>6</a:t>
             </a:fld>
             <a:endParaRPr kumimoji="0" lang="en-US" sz="1200" b="1" i="0" u="none" strike="noStrike" kern="1200" cap="none" spc="0" normalizeH="0" baseline="0" noProof="0" dirty="0">
               <a:ln>
@@ -3605,7 +4683,7 @@
 </p:sld>
 </file>
 
-<file path=ppt/slides/slide5.xml><?xml version="1.0" encoding="utf-8"?>
+<file path=ppt/slides/slide7.xml><?xml version="1.0" encoding="utf-8"?>
 <p:sld xmlns:a="http://schemas.openxmlformats.org/drawingml/2006/main" xmlns:r="http://schemas.openxmlformats.org/officeDocument/2006/relationships" xmlns:p="http://schemas.openxmlformats.org/presentationml/2006/main">
   <p:cSld>
     <p:spTree>
@@ -3730,7 +4808,7 @@
             <a:fld id="{E86E9A59-3F40-F444-BD0F-26E6D063A5F0}" type="slidenum">
               <a:rPr lang="en-US" smtClean="0"/>
               <a:pPr/>
-              <a:t>5</a:t>
+              <a:t>7</a:t>
             </a:fld>
             <a:endParaRPr lang="en-US" dirty="0"/>
           </a:p>
@@ -3749,7 +4827,7 @@
 </p:sld>
 </file>
 
-<file path=ppt/slides/slide6.xml><?xml version="1.0" encoding="utf-8"?>
+<file path=ppt/slides/slide8.xml><?xml version="1.0" encoding="utf-8"?>
 <p:sld xmlns:a="http://schemas.openxmlformats.org/drawingml/2006/main" xmlns:r="http://schemas.openxmlformats.org/officeDocument/2006/relationships" xmlns:p="http://schemas.openxmlformats.org/presentationml/2006/main">
   <p:cSld>
     <p:spTree>
@@ -3913,7 +4991,7 @@
             <a:fld id="{E86E9A59-3F40-F444-BD0F-26E6D063A5F0}" type="slidenum">
               <a:rPr lang="en-US" smtClean="0"/>
               <a:pPr/>
-              <a:t>6</a:t>
+              <a:t>8</a:t>
             </a:fld>
             <a:endParaRPr lang="en-US" dirty="0"/>
           </a:p>
@@ -4901,18 +5979,18 @@
 </file>
 
 <file path=customXml/item2.xml><?xml version="1.0" encoding="utf-8"?>
+<p:properties xmlns:p="http://schemas.microsoft.com/office/2006/metadata/properties" xmlns:xsi="http://www.w3.org/2001/XMLSchema-instance" xmlns:pc="http://schemas.microsoft.com/office/infopath/2007/PartnerControls">
+  <documentManagement/>
+</p:properties>
+</file>
+
+<file path=customXml/item3.xml><?xml version="1.0" encoding="utf-8"?>
 <?mso-contentType ?>
 <FormTemplates xmlns="http://schemas.microsoft.com/sharepoint/v3/contenttype/forms">
   <Display>DocumentLibraryForm</Display>
   <Edit>DocumentLibraryForm</Edit>
   <New>DocumentLibraryForm</New>
 </FormTemplates>
-</file>
-
-<file path=customXml/item3.xml><?xml version="1.0" encoding="utf-8"?>
-<p:properties xmlns:p="http://schemas.microsoft.com/office/2006/metadata/properties" xmlns:xsi="http://www.w3.org/2001/XMLSchema-instance" xmlns:pc="http://schemas.microsoft.com/office/infopath/2007/PartnerControls">
-  <documentManagement/>
-</p:properties>
 </file>
 
 <file path=customXml/itemProps1.xml><?xml version="1.0" encoding="utf-8"?>
@@ -4935,14 +6013,6 @@
 </file>
 
 <file path=customXml/itemProps2.xml><?xml version="1.0" encoding="utf-8"?>
-<ds:datastoreItem xmlns:ds="http://schemas.openxmlformats.org/officeDocument/2006/customXml" ds:itemID="{18870CC1-235C-4BD8-A628-EDFC5A270D05}">
-  <ds:schemaRefs>
-    <ds:schemaRef ds:uri="http://schemas.microsoft.com/sharepoint/v3/contenttype/forms"/>
-  </ds:schemaRefs>
-</ds:datastoreItem>
-</file>
-
-<file path=customXml/itemProps3.xml><?xml version="1.0" encoding="utf-8"?>
 <ds:datastoreItem xmlns:ds="http://schemas.openxmlformats.org/officeDocument/2006/customXml" ds:itemID="{78E6E0BF-F4A0-41B6-8685-63FD81E4D1BE}">
   <ds:schemaRefs>
     <ds:schemaRef ds:uri="213a615a-fc15-48a4-b44f-57f78f25f7bf"/>
@@ -4957,4 +6027,12 @@
     <ds:schemaRef ds:uri="http://www.w3.org/XML/1998/namespace"/>
   </ds:schemaRefs>
 </ds:datastoreItem>
+</file>
+
+<file path=customXml/itemProps3.xml><?xml version="1.0" encoding="utf-8"?>
+<ds:datastoreItem xmlns:ds="http://schemas.openxmlformats.org/officeDocument/2006/customXml" ds:itemID="{18870CC1-235C-4BD8-A628-EDFC5A270D05}">
+  <ds:schemaRefs>
+    <ds:schemaRef ds:uri="http://schemas.microsoft.com/sharepoint/v3/contenttype/forms"/>
+  </ds:schemaRefs>
+</ds:datastoreItem>
 </file>
</xml_diff>